<commit_message>
Update presentation with citation
</commit_message>
<xml_diff>
--- a/docs/Presentations/VNVPlanPresentation/VNVPlanPresentation.pptx
+++ b/docs/Presentations/VNVPlanPresentation/VNVPlanPresentation.pptx
@@ -124,7 +124,7 @@
 <file path=ppt/revisionInfo.xml><?xml version="1.0" encoding="utf-8"?>
 <p1510:revInfo xmlns:a="http://schemas.openxmlformats.org/drawingml/2006/main" xmlns:r="http://schemas.openxmlformats.org/officeDocument/2006/relationships" xmlns:p1510="http://schemas.microsoft.com/office/powerpoint/2015/10/main">
   <p1510:revLst>
-    <p1510:client id="{F0BA40D0-9182-44C0-BEDE-14048F85CCAB}" v="69" dt="2024-02-10T19:51:34.114"/>
+    <p1510:client id="{F0BA40D0-9182-44C0-BEDE-14048F85CCAB}" v="72" dt="2024-02-13T16:49:02.013"/>
   </p1510:revLst>
 </p1510:revInfo>
 </file>
@@ -134,7 +134,7 @@
   <pc:docChgLst>
     <pc:chgData name="Hunter Ceranic" userId="55b8025d37c61089" providerId="LiveId" clId="{F0BA40D0-9182-44C0-BEDE-14048F85CCAB}"/>
     <pc:docChg chg="undo custSel addSld delSld modSld">
-      <pc:chgData name="Hunter Ceranic" userId="55b8025d37c61089" providerId="LiveId" clId="{F0BA40D0-9182-44C0-BEDE-14048F85CCAB}" dt="2024-02-10T20:18:30.980" v="3672" actId="1076"/>
+      <pc:chgData name="Hunter Ceranic" userId="55b8025d37c61089" providerId="LiveId" clId="{F0BA40D0-9182-44C0-BEDE-14048F85CCAB}" dt="2024-02-13T16:49:21.003" v="3698" actId="20577"/>
       <pc:docMkLst>
         <pc:docMk/>
       </pc:docMkLst>
@@ -555,7 +555,7 @@
         </pc:spChg>
       </pc:sldChg>
       <pc:sldChg chg="addSp delSp modSp new mod modClrScheme chgLayout">
-        <pc:chgData name="Hunter Ceranic" userId="55b8025d37c61089" providerId="LiveId" clId="{F0BA40D0-9182-44C0-BEDE-14048F85CCAB}" dt="2024-02-10T20:04:17.529" v="2939" actId="20577"/>
+        <pc:chgData name="Hunter Ceranic" userId="55b8025d37c61089" providerId="LiveId" clId="{F0BA40D0-9182-44C0-BEDE-14048F85CCAB}" dt="2024-02-13T16:49:21.003" v="3698" actId="20577"/>
         <pc:sldMkLst>
           <pc:docMk/>
           <pc:sldMk cId="977562255" sldId="266"/>
@@ -568,12 +568,36 @@
             <ac:spMk id="2" creationId="{0671E9AD-2014-3516-E029-6838AAA80005}"/>
           </ac:spMkLst>
         </pc:spChg>
+        <pc:spChg chg="add mod">
+          <ac:chgData name="Hunter Ceranic" userId="55b8025d37c61089" providerId="LiveId" clId="{F0BA40D0-9182-44C0-BEDE-14048F85CCAB}" dt="2024-02-13T16:49:21.003" v="3698" actId="20577"/>
+          <ac:spMkLst>
+            <pc:docMk/>
+            <pc:sldMk cId="977562255" sldId="266"/>
+            <ac:spMk id="2" creationId="{48F11C8C-AC18-5C0C-6E5B-08383D13061A}"/>
+          </ac:spMkLst>
+        </pc:spChg>
         <pc:spChg chg="del mod ord">
           <ac:chgData name="Hunter Ceranic" userId="55b8025d37c61089" providerId="LiveId" clId="{F0BA40D0-9182-44C0-BEDE-14048F85CCAB}" dt="2024-02-10T19:27:07.140" v="1664" actId="700"/>
           <ac:spMkLst>
             <pc:docMk/>
             <pc:sldMk cId="977562255" sldId="266"/>
             <ac:spMk id="3" creationId="{04A7D1BB-5C35-3A1A-DCDA-6D6D51997BC2}"/>
+          </ac:spMkLst>
+        </pc:spChg>
+        <pc:spChg chg="add mod">
+          <ac:chgData name="Hunter Ceranic" userId="55b8025d37c61089" providerId="LiveId" clId="{F0BA40D0-9182-44C0-BEDE-14048F85CCAB}" dt="2024-02-13T16:49:14.917" v="3689" actId="1076"/>
+          <ac:spMkLst>
+            <pc:docMk/>
+            <pc:sldMk cId="977562255" sldId="266"/>
+            <ac:spMk id="3" creationId="{A8E8FC25-9A9D-1CA9-7518-58ECCCC5E959}"/>
+          </ac:spMkLst>
+        </pc:spChg>
+        <pc:spChg chg="add mod">
+          <ac:chgData name="Hunter Ceranic" userId="55b8025d37c61089" providerId="LiveId" clId="{F0BA40D0-9182-44C0-BEDE-14048F85CCAB}" dt="2024-02-13T16:49:08.457" v="3688" actId="1076"/>
+          <ac:spMkLst>
+            <pc:docMk/>
+            <pc:sldMk cId="977562255" sldId="266"/>
+            <ac:spMk id="4" creationId="{7D4C2E95-4711-EB14-408C-8B5B6ED3B998}"/>
           </ac:spMkLst>
         </pc:spChg>
         <pc:spChg chg="del">
@@ -4826,7 +4850,7 @@
           <a:p>
             <a:fld id="{9E418AF7-6E72-4403-B085-4589D1110134}" type="datetimeFigureOut">
               <a:rPr lang="en-CA" smtClean="0"/>
-              <a:t>2024-02-10</a:t>
+              <a:t>2024-02-13</a:t>
             </a:fld>
             <a:endParaRPr lang="en-CA"/>
           </a:p>
@@ -5325,7 +5349,7 @@
           <a:p>
             <a:fld id="{D64C250B-3F0E-4970-9318-C9D7D394820E}" type="datetime1">
               <a:rPr lang="en-US" smtClean="0"/>
-              <a:t>2/10/2024</a:t>
+              <a:t>2/13/2024</a:t>
             </a:fld>
             <a:endParaRPr lang="en-US" dirty="0"/>
           </a:p>
@@ -5740,7 +5764,7 @@
           <a:p>
             <a:fld id="{7ED2D475-D7C3-4D53-A451-04FF36E3C7CA}" type="datetime1">
               <a:rPr lang="en-US" smtClean="0"/>
-              <a:t>2/10/2024</a:t>
+              <a:t>2/13/2024</a:t>
             </a:fld>
             <a:endParaRPr lang="en-US"/>
           </a:p>
@@ -6232,7 +6256,7 @@
           <a:p>
             <a:fld id="{B13D53CE-B973-4FCF-BB6D-73B61285C9EE}" type="datetime1">
               <a:rPr lang="en-US" smtClean="0"/>
-              <a:t>2/10/2024</a:t>
+              <a:t>2/13/2024</a:t>
             </a:fld>
             <a:endParaRPr lang="en-US"/>
           </a:p>
@@ -6719,7 +6743,7 @@
           <a:p>
             <a:fld id="{6F168777-EDFC-4AB3-A960-739B6325059F}" type="datetime1">
               <a:rPr lang="en-US" smtClean="0"/>
-              <a:t>2/10/2024</a:t>
+              <a:t>2/13/2024</a:t>
             </a:fld>
             <a:endParaRPr lang="en-US" dirty="0"/>
           </a:p>
@@ -7488,7 +7512,7 @@
           <a:p>
             <a:fld id="{4D320339-89DE-45C9-8EA6-5855C5BC4EC8}" type="datetime1">
               <a:rPr lang="en-US" smtClean="0"/>
-              <a:t>2/10/2024</a:t>
+              <a:t>2/13/2024</a:t>
             </a:fld>
             <a:endParaRPr lang="en-US"/>
           </a:p>
@@ -7970,7 +7994,7 @@
           <a:p>
             <a:fld id="{D97A0DFF-DDA9-437C-A4F4-5DF1C7108CDC}" type="datetime1">
               <a:rPr lang="en-US" smtClean="0"/>
-              <a:t>2/10/2024</a:t>
+              <a:t>2/13/2024</a:t>
             </a:fld>
             <a:endParaRPr lang="en-US"/>
           </a:p>
@@ -8666,7 +8690,7 @@
           <a:p>
             <a:fld id="{673E6A36-CFDC-4F59-94D9-5938EA3FFC22}" type="datetime1">
               <a:rPr lang="en-US" smtClean="0"/>
-              <a:t>2/10/2024</a:t>
+              <a:t>2/13/2024</a:t>
             </a:fld>
             <a:endParaRPr lang="en-US"/>
           </a:p>
@@ -9091,7 +9115,7 @@
           <a:p>
             <a:fld id="{585D03DC-4143-495E-82F1-B947FE3989AD}" type="datetime1">
               <a:rPr lang="en-US" smtClean="0"/>
-              <a:t>2/10/2024</a:t>
+              <a:t>2/13/2024</a:t>
             </a:fld>
             <a:endParaRPr lang="en-US"/>
           </a:p>
@@ -9488,7 +9512,7 @@
           <a:p>
             <a:fld id="{933DFF73-74E1-4718-A7DF-CE04E8339893}" type="datetime1">
               <a:rPr lang="en-US" smtClean="0"/>
-              <a:t>2/10/2024</a:t>
+              <a:t>2/13/2024</a:t>
             </a:fld>
             <a:endParaRPr lang="en-US"/>
           </a:p>
@@ -10083,7 +10107,7 @@
           <a:p>
             <a:fld id="{4EB71C7E-24B9-48A5-BD1A-C92D07E70F00}" type="datetime1">
               <a:rPr lang="en-US" smtClean="0"/>
-              <a:t>2/10/2024</a:t>
+              <a:t>2/13/2024</a:t>
             </a:fld>
             <a:endParaRPr lang="en-US"/>
           </a:p>
@@ -10658,7 +10682,7 @@
           <a:p>
             <a:fld id="{2E0181FF-DCB4-4A8B-8A91-9A9A7438884D}" type="datetime1">
               <a:rPr lang="en-US" smtClean="0"/>
-              <a:t>2/10/2024</a:t>
+              <a:t>2/13/2024</a:t>
             </a:fld>
             <a:endParaRPr lang="en-US"/>
           </a:p>
@@ -11184,7 +11208,7 @@
           <a:p>
             <a:fld id="{69064C32-6B48-4F37-8ABD-2C75CE9DDDEF}" type="datetime1">
               <a:rPr lang="en-US" smtClean="0"/>
-              <a:t>2/10/2024</a:t>
+              <a:t>2/13/2024</a:t>
             </a:fld>
             <a:endParaRPr lang="en-US" dirty="0"/>
           </a:p>
@@ -14168,6 +14192,111 @@
             <a:r>
               <a:rPr lang="en-CA" sz="1600" dirty="0"/>
               <a:t>It can be used to calculate metrics for validity.  Accuracy, Misclassification, and Precision are the most important for this project.</a:t>
+            </a:r>
+          </a:p>
+        </p:txBody>
+      </p:sp>
+      <p:sp>
+        <p:nvSpPr>
+          <p:cNvPr id="2" name="TextBox 1">
+            <a:extLst>
+              <a:ext uri="{FF2B5EF4-FFF2-40B4-BE49-F238E27FC236}">
+                <a16:creationId xmlns:a16="http://schemas.microsoft.com/office/drawing/2014/main" id="{48F11C8C-AC18-5C0C-6E5B-08383D13061A}"/>
+              </a:ext>
+            </a:extLst>
+          </p:cNvPr>
+          <p:cNvSpPr txBox="1"/>
+          <p:nvPr/>
+        </p:nvSpPr>
+        <p:spPr>
+          <a:xfrm>
+            <a:off x="2946238" y="6581001"/>
+            <a:ext cx="10265228" cy="276999"/>
+          </a:xfrm>
+          <a:prstGeom prst="rect">
+            <a:avLst/>
+          </a:prstGeom>
+          <a:noFill/>
+        </p:spPr>
+        <p:txBody>
+          <a:bodyPr wrap="square" rtlCol="0">
+            <a:spAutoFit/>
+          </a:bodyPr>
+          <a:lstStyle/>
+          <a:p>
+            <a:r>
+              <a:rPr lang="en-CA" sz="1200" dirty="0"/>
+              <a:t>[1]https://towardsdatascience.com/taking-the-confusion-out-of-confusion-matrices-c1ce054b3d3e</a:t>
+            </a:r>
+          </a:p>
+        </p:txBody>
+      </p:sp>
+      <p:sp>
+        <p:nvSpPr>
+          <p:cNvPr id="3" name="TextBox 2">
+            <a:extLst>
+              <a:ext uri="{FF2B5EF4-FFF2-40B4-BE49-F238E27FC236}">
+                <a16:creationId xmlns:a16="http://schemas.microsoft.com/office/drawing/2014/main" id="{A8E8FC25-9A9D-1CA9-7518-58ECCCC5E959}"/>
+              </a:ext>
+            </a:extLst>
+          </p:cNvPr>
+          <p:cNvSpPr txBox="1"/>
+          <p:nvPr/>
+        </p:nvSpPr>
+        <p:spPr>
+          <a:xfrm>
+            <a:off x="8534399" y="6079351"/>
+            <a:ext cx="478971" cy="276999"/>
+          </a:xfrm>
+          <a:prstGeom prst="rect">
+            <a:avLst/>
+          </a:prstGeom>
+          <a:noFill/>
+        </p:spPr>
+        <p:txBody>
+          <a:bodyPr wrap="square" rtlCol="0">
+            <a:spAutoFit/>
+          </a:bodyPr>
+          <a:lstStyle/>
+          <a:p>
+            <a:r>
+              <a:rPr lang="en-CA" sz="1200" dirty="0"/>
+              <a:t>[1]</a:t>
+            </a:r>
+          </a:p>
+        </p:txBody>
+      </p:sp>
+      <p:sp>
+        <p:nvSpPr>
+          <p:cNvPr id="4" name="TextBox 3">
+            <a:extLst>
+              <a:ext uri="{FF2B5EF4-FFF2-40B4-BE49-F238E27FC236}">
+                <a16:creationId xmlns:a16="http://schemas.microsoft.com/office/drawing/2014/main" id="{7D4C2E95-4711-EB14-408C-8B5B6ED3B998}"/>
+              </a:ext>
+            </a:extLst>
+          </p:cNvPr>
+          <p:cNvSpPr txBox="1"/>
+          <p:nvPr/>
+        </p:nvSpPr>
+        <p:spPr>
+          <a:xfrm>
+            <a:off x="9194965" y="3359101"/>
+            <a:ext cx="478971" cy="276999"/>
+          </a:xfrm>
+          <a:prstGeom prst="rect">
+            <a:avLst/>
+          </a:prstGeom>
+          <a:noFill/>
+        </p:spPr>
+        <p:txBody>
+          <a:bodyPr wrap="square" rtlCol="0">
+            <a:spAutoFit/>
+          </a:bodyPr>
+          <a:lstStyle/>
+          <a:p>
+            <a:r>
+              <a:rPr lang="en-CA" sz="1200" dirty="0"/>
+              <a:t>[1]</a:t>
             </a:r>
           </a:p>
         </p:txBody>

</xml_diff>